<commit_message>
add: add slide for UI of authentication in inflow
</commit_message>
<xml_diff>
--- a/AuthenticationInFlowSystem.pptx
+++ b/AuthenticationInFlowSystem.pptx
@@ -5,10 +5,10 @@
     <p:sldMasterId id="2147483678" r:id="rId3"/>
   </p:sldMasterIdLst>
   <p:notesMasterIdLst>
-    <p:notesMasterId r:id="rId11"/>
+    <p:notesMasterId r:id="rId20"/>
   </p:notesMasterIdLst>
   <p:handoutMasterIdLst>
-    <p:handoutMasterId r:id="rId12"/>
+    <p:handoutMasterId r:id="rId21"/>
   </p:handoutMasterIdLst>
   <p:sldIdLst>
     <p:sldId id="321" r:id="rId4"/>
@@ -18,11 +18,20 @@
     <p:sldId id="333" r:id="rId8"/>
     <p:sldId id="332" r:id="rId9"/>
     <p:sldId id="334" r:id="rId10"/>
+    <p:sldId id="339" r:id="rId11"/>
+    <p:sldId id="340" r:id="rId12"/>
+    <p:sldId id="341" r:id="rId13"/>
+    <p:sldId id="342" r:id="rId14"/>
+    <p:sldId id="335" r:id="rId15"/>
+    <p:sldId id="336" r:id="rId16"/>
+    <p:sldId id="337" r:id="rId17"/>
+    <p:sldId id="338" r:id="rId18"/>
+    <p:sldId id="343" r:id="rId19"/>
   </p:sldIdLst>
   <p:sldSz cx="12192000" cy="6858000"/>
   <p:notesSz cx="6858000" cy="9144000"/>
   <p:custDataLst>
-    <p:tags r:id="rId13"/>
+    <p:tags r:id="rId22"/>
   </p:custDataLst>
   <p:defaultTextStyle>
     <a:defPPr>
@@ -134,6 +143,15 @@
             <p14:sldId id="333"/>
             <p14:sldId id="332"/>
             <p14:sldId id="334"/>
+            <p14:sldId id="339"/>
+            <p14:sldId id="340"/>
+            <p14:sldId id="341"/>
+            <p14:sldId id="342"/>
+            <p14:sldId id="335"/>
+            <p14:sldId id="336"/>
+            <p14:sldId id="337"/>
+            <p14:sldId id="338"/>
+            <p14:sldId id="343"/>
           </p14:sldIdLst>
         </p14:section>
       </p14:sectionLst>
@@ -790,6 +808,431 @@
 </p:notes>
 </file>
 
+<file path=ppt/notesSlides/notesSlide10.xml><?xml version="1.0" encoding="utf-8"?>
+<p:notes xmlns:a="http://schemas.openxmlformats.org/drawingml/2006/main" xmlns:r="http://schemas.openxmlformats.org/officeDocument/2006/relationships" xmlns:p="http://schemas.openxmlformats.org/presentationml/2006/main">
+  <p:cSld>
+    <p:spTree>
+      <p:nvGrpSpPr>
+        <p:cNvPr id="1" name=""/>
+        <p:cNvGrpSpPr/>
+        <p:nvPr/>
+      </p:nvGrpSpPr>
+      <p:grpSpPr>
+        <a:xfrm>
+          <a:off x="0" y="0"/>
+          <a:ext cx="0" cy="0"/>
+          <a:chOff x="0" y="0"/>
+          <a:chExt cx="0" cy="0"/>
+        </a:xfrm>
+      </p:grpSpPr>
+      <p:sp>
+        <p:nvSpPr>
+          <p:cNvPr id="2" name="Slide Image Placeholder 1"/>
+          <p:cNvSpPr>
+            <a:spLocks noGrp="1" noRot="1" noChangeAspect="1"/>
+          </p:cNvSpPr>
+          <p:nvPr>
+            <p:ph type="sldImg"/>
+          </p:nvPr>
+        </p:nvSpPr>
+        <p:spPr/>
+      </p:sp>
+      <p:sp>
+        <p:nvSpPr>
+          <p:cNvPr id="3" name="Notes Placeholder 2"/>
+          <p:cNvSpPr>
+            <a:spLocks noGrp="1"/>
+          </p:cNvSpPr>
+          <p:nvPr>
+            <p:ph type="body" idx="1"/>
+          </p:nvPr>
+        </p:nvSpPr>
+        <p:spPr/>
+        <p:txBody>
+          <a:bodyPr/>
+          <a:lstStyle/>
+          <a:p>
+            <a:endParaRPr lang="en-US" dirty="0"/>
+          </a:p>
+        </p:txBody>
+      </p:sp>
+      <p:sp>
+        <p:nvSpPr>
+          <p:cNvPr id="4" name="Slide Number Placeholder 3"/>
+          <p:cNvSpPr>
+            <a:spLocks noGrp="1"/>
+          </p:cNvSpPr>
+          <p:nvPr>
+            <p:ph type="sldNum" sz="quarter" idx="5"/>
+          </p:nvPr>
+        </p:nvSpPr>
+        <p:spPr/>
+        <p:txBody>
+          <a:bodyPr/>
+          <a:lstStyle/>
+          <a:p>
+            <a:fld id="{6A4FF178-7F5C-4C53-AC97-DF4205D97146}" type="slidenum">
+              <a:rPr lang="de-CH" smtClean="0"/>
+              <a:pPr/>
+              <a:t>12</a:t>
+            </a:fld>
+            <a:endParaRPr lang="de-CH"/>
+          </a:p>
+        </p:txBody>
+      </p:sp>
+    </p:spTree>
+    <p:extLst>
+      <p:ext uri="{BB962C8B-B14F-4D97-AF65-F5344CB8AC3E}">
+        <p14:creationId xmlns:p14="http://schemas.microsoft.com/office/powerpoint/2010/main" val="4247834264"/>
+      </p:ext>
+    </p:extLst>
+  </p:cSld>
+  <p:clrMapOvr>
+    <a:masterClrMapping/>
+  </p:clrMapOvr>
+</p:notes>
+</file>
+
+<file path=ppt/notesSlides/notesSlide11.xml><?xml version="1.0" encoding="utf-8"?>
+<p:notes xmlns:a="http://schemas.openxmlformats.org/drawingml/2006/main" xmlns:r="http://schemas.openxmlformats.org/officeDocument/2006/relationships" xmlns:p="http://schemas.openxmlformats.org/presentationml/2006/main">
+  <p:cSld>
+    <p:spTree>
+      <p:nvGrpSpPr>
+        <p:cNvPr id="1" name=""/>
+        <p:cNvGrpSpPr/>
+        <p:nvPr/>
+      </p:nvGrpSpPr>
+      <p:grpSpPr>
+        <a:xfrm>
+          <a:off x="0" y="0"/>
+          <a:ext cx="0" cy="0"/>
+          <a:chOff x="0" y="0"/>
+          <a:chExt cx="0" cy="0"/>
+        </a:xfrm>
+      </p:grpSpPr>
+      <p:sp>
+        <p:nvSpPr>
+          <p:cNvPr id="2" name="Slide Image Placeholder 1"/>
+          <p:cNvSpPr>
+            <a:spLocks noGrp="1" noRot="1" noChangeAspect="1"/>
+          </p:cNvSpPr>
+          <p:nvPr>
+            <p:ph type="sldImg"/>
+          </p:nvPr>
+        </p:nvSpPr>
+        <p:spPr/>
+      </p:sp>
+      <p:sp>
+        <p:nvSpPr>
+          <p:cNvPr id="3" name="Notes Placeholder 2"/>
+          <p:cNvSpPr>
+            <a:spLocks noGrp="1"/>
+          </p:cNvSpPr>
+          <p:nvPr>
+            <p:ph type="body" idx="1"/>
+          </p:nvPr>
+        </p:nvSpPr>
+        <p:spPr/>
+        <p:txBody>
+          <a:bodyPr/>
+          <a:lstStyle/>
+          <a:p>
+            <a:endParaRPr lang="en-US" dirty="0"/>
+          </a:p>
+        </p:txBody>
+      </p:sp>
+      <p:sp>
+        <p:nvSpPr>
+          <p:cNvPr id="4" name="Slide Number Placeholder 3"/>
+          <p:cNvSpPr>
+            <a:spLocks noGrp="1"/>
+          </p:cNvSpPr>
+          <p:nvPr>
+            <p:ph type="sldNum" sz="quarter" idx="5"/>
+          </p:nvPr>
+        </p:nvSpPr>
+        <p:spPr/>
+        <p:txBody>
+          <a:bodyPr/>
+          <a:lstStyle/>
+          <a:p>
+            <a:fld id="{6A4FF178-7F5C-4C53-AC97-DF4205D97146}" type="slidenum">
+              <a:rPr lang="de-CH" smtClean="0"/>
+              <a:pPr/>
+              <a:t>13</a:t>
+            </a:fld>
+            <a:endParaRPr lang="de-CH"/>
+          </a:p>
+        </p:txBody>
+      </p:sp>
+    </p:spTree>
+    <p:extLst>
+      <p:ext uri="{BB962C8B-B14F-4D97-AF65-F5344CB8AC3E}">
+        <p14:creationId xmlns:p14="http://schemas.microsoft.com/office/powerpoint/2010/main" val="3560322700"/>
+      </p:ext>
+    </p:extLst>
+  </p:cSld>
+  <p:clrMapOvr>
+    <a:masterClrMapping/>
+  </p:clrMapOvr>
+</p:notes>
+</file>
+
+<file path=ppt/notesSlides/notesSlide12.xml><?xml version="1.0" encoding="utf-8"?>
+<p:notes xmlns:a="http://schemas.openxmlformats.org/drawingml/2006/main" xmlns:r="http://schemas.openxmlformats.org/officeDocument/2006/relationships" xmlns:p="http://schemas.openxmlformats.org/presentationml/2006/main">
+  <p:cSld>
+    <p:spTree>
+      <p:nvGrpSpPr>
+        <p:cNvPr id="1" name=""/>
+        <p:cNvGrpSpPr/>
+        <p:nvPr/>
+      </p:nvGrpSpPr>
+      <p:grpSpPr>
+        <a:xfrm>
+          <a:off x="0" y="0"/>
+          <a:ext cx="0" cy="0"/>
+          <a:chOff x="0" y="0"/>
+          <a:chExt cx="0" cy="0"/>
+        </a:xfrm>
+      </p:grpSpPr>
+      <p:sp>
+        <p:nvSpPr>
+          <p:cNvPr id="2" name="Slide Image Placeholder 1"/>
+          <p:cNvSpPr>
+            <a:spLocks noGrp="1" noRot="1" noChangeAspect="1"/>
+          </p:cNvSpPr>
+          <p:nvPr>
+            <p:ph type="sldImg"/>
+          </p:nvPr>
+        </p:nvSpPr>
+        <p:spPr/>
+      </p:sp>
+      <p:sp>
+        <p:nvSpPr>
+          <p:cNvPr id="3" name="Notes Placeholder 2"/>
+          <p:cNvSpPr>
+            <a:spLocks noGrp="1"/>
+          </p:cNvSpPr>
+          <p:nvPr>
+            <p:ph type="body" idx="1"/>
+          </p:nvPr>
+        </p:nvSpPr>
+        <p:spPr/>
+        <p:txBody>
+          <a:bodyPr/>
+          <a:lstStyle/>
+          <a:p>
+            <a:endParaRPr lang="en-US" dirty="0"/>
+          </a:p>
+        </p:txBody>
+      </p:sp>
+      <p:sp>
+        <p:nvSpPr>
+          <p:cNvPr id="4" name="Slide Number Placeholder 3"/>
+          <p:cNvSpPr>
+            <a:spLocks noGrp="1"/>
+          </p:cNvSpPr>
+          <p:nvPr>
+            <p:ph type="sldNum" sz="quarter" idx="5"/>
+          </p:nvPr>
+        </p:nvSpPr>
+        <p:spPr/>
+        <p:txBody>
+          <a:bodyPr/>
+          <a:lstStyle/>
+          <a:p>
+            <a:fld id="{6A4FF178-7F5C-4C53-AC97-DF4205D97146}" type="slidenum">
+              <a:rPr lang="de-CH" smtClean="0"/>
+              <a:pPr/>
+              <a:t>14</a:t>
+            </a:fld>
+            <a:endParaRPr lang="de-CH"/>
+          </a:p>
+        </p:txBody>
+      </p:sp>
+    </p:spTree>
+    <p:extLst>
+      <p:ext uri="{BB962C8B-B14F-4D97-AF65-F5344CB8AC3E}">
+        <p14:creationId xmlns:p14="http://schemas.microsoft.com/office/powerpoint/2010/main" val="3145232801"/>
+      </p:ext>
+    </p:extLst>
+  </p:cSld>
+  <p:clrMapOvr>
+    <a:masterClrMapping/>
+  </p:clrMapOvr>
+</p:notes>
+</file>
+
+<file path=ppt/notesSlides/notesSlide13.xml><?xml version="1.0" encoding="utf-8"?>
+<p:notes xmlns:a="http://schemas.openxmlformats.org/drawingml/2006/main" xmlns:r="http://schemas.openxmlformats.org/officeDocument/2006/relationships" xmlns:p="http://schemas.openxmlformats.org/presentationml/2006/main">
+  <p:cSld>
+    <p:spTree>
+      <p:nvGrpSpPr>
+        <p:cNvPr id="1" name=""/>
+        <p:cNvGrpSpPr/>
+        <p:nvPr/>
+      </p:nvGrpSpPr>
+      <p:grpSpPr>
+        <a:xfrm>
+          <a:off x="0" y="0"/>
+          <a:ext cx="0" cy="0"/>
+          <a:chOff x="0" y="0"/>
+          <a:chExt cx="0" cy="0"/>
+        </a:xfrm>
+      </p:grpSpPr>
+      <p:sp>
+        <p:nvSpPr>
+          <p:cNvPr id="2" name="Slide Image Placeholder 1"/>
+          <p:cNvSpPr>
+            <a:spLocks noGrp="1" noRot="1" noChangeAspect="1"/>
+          </p:cNvSpPr>
+          <p:nvPr>
+            <p:ph type="sldImg"/>
+          </p:nvPr>
+        </p:nvSpPr>
+        <p:spPr/>
+      </p:sp>
+      <p:sp>
+        <p:nvSpPr>
+          <p:cNvPr id="3" name="Notes Placeholder 2"/>
+          <p:cNvSpPr>
+            <a:spLocks noGrp="1"/>
+          </p:cNvSpPr>
+          <p:nvPr>
+            <p:ph type="body" idx="1"/>
+          </p:nvPr>
+        </p:nvSpPr>
+        <p:spPr/>
+        <p:txBody>
+          <a:bodyPr/>
+          <a:lstStyle/>
+          <a:p>
+            <a:endParaRPr lang="en-US" dirty="0"/>
+          </a:p>
+        </p:txBody>
+      </p:sp>
+      <p:sp>
+        <p:nvSpPr>
+          <p:cNvPr id="4" name="Slide Number Placeholder 3"/>
+          <p:cNvSpPr>
+            <a:spLocks noGrp="1"/>
+          </p:cNvSpPr>
+          <p:nvPr>
+            <p:ph type="sldNum" sz="quarter" idx="5"/>
+          </p:nvPr>
+        </p:nvSpPr>
+        <p:spPr/>
+        <p:txBody>
+          <a:bodyPr/>
+          <a:lstStyle/>
+          <a:p>
+            <a:fld id="{6A4FF178-7F5C-4C53-AC97-DF4205D97146}" type="slidenum">
+              <a:rPr lang="de-CH" smtClean="0"/>
+              <a:pPr/>
+              <a:t>15</a:t>
+            </a:fld>
+            <a:endParaRPr lang="de-CH"/>
+          </a:p>
+        </p:txBody>
+      </p:sp>
+    </p:spTree>
+    <p:extLst>
+      <p:ext uri="{BB962C8B-B14F-4D97-AF65-F5344CB8AC3E}">
+        <p14:creationId xmlns:p14="http://schemas.microsoft.com/office/powerpoint/2010/main" val="2044150376"/>
+      </p:ext>
+    </p:extLst>
+  </p:cSld>
+  <p:clrMapOvr>
+    <a:masterClrMapping/>
+  </p:clrMapOvr>
+</p:notes>
+</file>
+
+<file path=ppt/notesSlides/notesSlide14.xml><?xml version="1.0" encoding="utf-8"?>
+<p:notes xmlns:a="http://schemas.openxmlformats.org/drawingml/2006/main" xmlns:r="http://schemas.openxmlformats.org/officeDocument/2006/relationships" xmlns:p="http://schemas.openxmlformats.org/presentationml/2006/main">
+  <p:cSld>
+    <p:spTree>
+      <p:nvGrpSpPr>
+        <p:cNvPr id="1" name=""/>
+        <p:cNvGrpSpPr/>
+        <p:nvPr/>
+      </p:nvGrpSpPr>
+      <p:grpSpPr>
+        <a:xfrm>
+          <a:off x="0" y="0"/>
+          <a:ext cx="0" cy="0"/>
+          <a:chOff x="0" y="0"/>
+          <a:chExt cx="0" cy="0"/>
+        </a:xfrm>
+      </p:grpSpPr>
+      <p:sp>
+        <p:nvSpPr>
+          <p:cNvPr id="2" name="Slide Image Placeholder 1"/>
+          <p:cNvSpPr>
+            <a:spLocks noGrp="1" noRot="1" noChangeAspect="1"/>
+          </p:cNvSpPr>
+          <p:nvPr>
+            <p:ph type="sldImg"/>
+          </p:nvPr>
+        </p:nvSpPr>
+        <p:spPr/>
+      </p:sp>
+      <p:sp>
+        <p:nvSpPr>
+          <p:cNvPr id="3" name="Notes Placeholder 2"/>
+          <p:cNvSpPr>
+            <a:spLocks noGrp="1"/>
+          </p:cNvSpPr>
+          <p:nvPr>
+            <p:ph type="body" idx="1"/>
+          </p:nvPr>
+        </p:nvSpPr>
+        <p:spPr/>
+        <p:txBody>
+          <a:bodyPr/>
+          <a:lstStyle/>
+          <a:p>
+            <a:endParaRPr lang="en-GB" noProof="0" dirty="0"/>
+          </a:p>
+        </p:txBody>
+      </p:sp>
+      <p:sp>
+        <p:nvSpPr>
+          <p:cNvPr id="4" name="Slide Number Placeholder 3"/>
+          <p:cNvSpPr>
+            <a:spLocks noGrp="1"/>
+          </p:cNvSpPr>
+          <p:nvPr>
+            <p:ph type="sldNum" sz="quarter" idx="5"/>
+          </p:nvPr>
+        </p:nvSpPr>
+        <p:spPr/>
+        <p:txBody>
+          <a:bodyPr/>
+          <a:lstStyle/>
+          <a:p>
+            <a:fld id="{6A4FF178-7F5C-4C53-AC97-DF4205D97146}" type="slidenum">
+              <a:rPr lang="de-CH" smtClean="0"/>
+              <a:pPr/>
+              <a:t>16</a:t>
+            </a:fld>
+            <a:endParaRPr lang="de-CH" dirty="0"/>
+          </a:p>
+        </p:txBody>
+      </p:sp>
+    </p:spTree>
+    <p:extLst>
+      <p:ext uri="{BB962C8B-B14F-4D97-AF65-F5344CB8AC3E}">
+        <p14:creationId xmlns:p14="http://schemas.microsoft.com/office/powerpoint/2010/main" val="3950484357"/>
+      </p:ext>
+    </p:extLst>
+  </p:cSld>
+  <p:clrMapOvr>
+    <a:masterClrMapping/>
+  </p:clrMapOvr>
+</p:notes>
+</file>
+
 <file path=ppt/notesSlides/notesSlide2.xml><?xml version="1.0" encoding="utf-8"?>
 <p:notes xmlns:a="http://schemas.openxmlformats.org/drawingml/2006/main" xmlns:r="http://schemas.openxmlformats.org/officeDocument/2006/relationships" xmlns:p="http://schemas.openxmlformats.org/presentationml/2006/main">
   <p:cSld>
@@ -1121,6 +1564,346 @@
     <p:extLst>
       <p:ext uri="{BB962C8B-B14F-4D97-AF65-F5344CB8AC3E}">
         <p14:creationId xmlns:p14="http://schemas.microsoft.com/office/powerpoint/2010/main" val="1782767810"/>
+      </p:ext>
+    </p:extLst>
+  </p:cSld>
+  <p:clrMapOvr>
+    <a:masterClrMapping/>
+  </p:clrMapOvr>
+</p:notes>
+</file>
+
+<file path=ppt/notesSlides/notesSlide6.xml><?xml version="1.0" encoding="utf-8"?>
+<p:notes xmlns:a="http://schemas.openxmlformats.org/drawingml/2006/main" xmlns:r="http://schemas.openxmlformats.org/officeDocument/2006/relationships" xmlns:p="http://schemas.openxmlformats.org/presentationml/2006/main">
+  <p:cSld>
+    <p:spTree>
+      <p:nvGrpSpPr>
+        <p:cNvPr id="1" name=""/>
+        <p:cNvGrpSpPr/>
+        <p:nvPr/>
+      </p:nvGrpSpPr>
+      <p:grpSpPr>
+        <a:xfrm>
+          <a:off x="0" y="0"/>
+          <a:ext cx="0" cy="0"/>
+          <a:chOff x="0" y="0"/>
+          <a:chExt cx="0" cy="0"/>
+        </a:xfrm>
+      </p:grpSpPr>
+      <p:sp>
+        <p:nvSpPr>
+          <p:cNvPr id="2" name="Slide Image Placeholder 1"/>
+          <p:cNvSpPr>
+            <a:spLocks noGrp="1" noRot="1" noChangeAspect="1"/>
+          </p:cNvSpPr>
+          <p:nvPr>
+            <p:ph type="sldImg"/>
+          </p:nvPr>
+        </p:nvSpPr>
+        <p:spPr/>
+      </p:sp>
+      <p:sp>
+        <p:nvSpPr>
+          <p:cNvPr id="3" name="Notes Placeholder 2"/>
+          <p:cNvSpPr>
+            <a:spLocks noGrp="1"/>
+          </p:cNvSpPr>
+          <p:nvPr>
+            <p:ph type="body" idx="1"/>
+          </p:nvPr>
+        </p:nvSpPr>
+        <p:spPr/>
+        <p:txBody>
+          <a:bodyPr/>
+          <a:lstStyle/>
+          <a:p>
+            <a:endParaRPr lang="en-US" dirty="0"/>
+          </a:p>
+        </p:txBody>
+      </p:sp>
+      <p:sp>
+        <p:nvSpPr>
+          <p:cNvPr id="4" name="Slide Number Placeholder 3"/>
+          <p:cNvSpPr>
+            <a:spLocks noGrp="1"/>
+          </p:cNvSpPr>
+          <p:nvPr>
+            <p:ph type="sldNum" sz="quarter" idx="5"/>
+          </p:nvPr>
+        </p:nvSpPr>
+        <p:spPr/>
+        <p:txBody>
+          <a:bodyPr/>
+          <a:lstStyle/>
+          <a:p>
+            <a:fld id="{6A4FF178-7F5C-4C53-AC97-DF4205D97146}" type="slidenum">
+              <a:rPr lang="de-CH" smtClean="0"/>
+              <a:pPr/>
+              <a:t>8</a:t>
+            </a:fld>
+            <a:endParaRPr lang="de-CH"/>
+          </a:p>
+        </p:txBody>
+      </p:sp>
+    </p:spTree>
+    <p:extLst>
+      <p:ext uri="{BB962C8B-B14F-4D97-AF65-F5344CB8AC3E}">
+        <p14:creationId xmlns:p14="http://schemas.microsoft.com/office/powerpoint/2010/main" val="1934343673"/>
+      </p:ext>
+    </p:extLst>
+  </p:cSld>
+  <p:clrMapOvr>
+    <a:masterClrMapping/>
+  </p:clrMapOvr>
+</p:notes>
+</file>
+
+<file path=ppt/notesSlides/notesSlide7.xml><?xml version="1.0" encoding="utf-8"?>
+<p:notes xmlns:a="http://schemas.openxmlformats.org/drawingml/2006/main" xmlns:r="http://schemas.openxmlformats.org/officeDocument/2006/relationships" xmlns:p="http://schemas.openxmlformats.org/presentationml/2006/main">
+  <p:cSld>
+    <p:spTree>
+      <p:nvGrpSpPr>
+        <p:cNvPr id="1" name=""/>
+        <p:cNvGrpSpPr/>
+        <p:nvPr/>
+      </p:nvGrpSpPr>
+      <p:grpSpPr>
+        <a:xfrm>
+          <a:off x="0" y="0"/>
+          <a:ext cx="0" cy="0"/>
+          <a:chOff x="0" y="0"/>
+          <a:chExt cx="0" cy="0"/>
+        </a:xfrm>
+      </p:grpSpPr>
+      <p:sp>
+        <p:nvSpPr>
+          <p:cNvPr id="2" name="Slide Image Placeholder 1"/>
+          <p:cNvSpPr>
+            <a:spLocks noGrp="1" noRot="1" noChangeAspect="1"/>
+          </p:cNvSpPr>
+          <p:nvPr>
+            <p:ph type="sldImg"/>
+          </p:nvPr>
+        </p:nvSpPr>
+        <p:spPr/>
+      </p:sp>
+      <p:sp>
+        <p:nvSpPr>
+          <p:cNvPr id="3" name="Notes Placeholder 2"/>
+          <p:cNvSpPr>
+            <a:spLocks noGrp="1"/>
+          </p:cNvSpPr>
+          <p:nvPr>
+            <p:ph type="body" idx="1"/>
+          </p:nvPr>
+        </p:nvSpPr>
+        <p:spPr/>
+        <p:txBody>
+          <a:bodyPr/>
+          <a:lstStyle/>
+          <a:p>
+            <a:endParaRPr lang="en-US" dirty="0"/>
+          </a:p>
+        </p:txBody>
+      </p:sp>
+      <p:sp>
+        <p:nvSpPr>
+          <p:cNvPr id="4" name="Slide Number Placeholder 3"/>
+          <p:cNvSpPr>
+            <a:spLocks noGrp="1"/>
+          </p:cNvSpPr>
+          <p:nvPr>
+            <p:ph type="sldNum" sz="quarter" idx="5"/>
+          </p:nvPr>
+        </p:nvSpPr>
+        <p:spPr/>
+        <p:txBody>
+          <a:bodyPr/>
+          <a:lstStyle/>
+          <a:p>
+            <a:fld id="{6A4FF178-7F5C-4C53-AC97-DF4205D97146}" type="slidenum">
+              <a:rPr lang="de-CH" smtClean="0"/>
+              <a:pPr/>
+              <a:t>9</a:t>
+            </a:fld>
+            <a:endParaRPr lang="de-CH"/>
+          </a:p>
+        </p:txBody>
+      </p:sp>
+    </p:spTree>
+    <p:extLst>
+      <p:ext uri="{BB962C8B-B14F-4D97-AF65-F5344CB8AC3E}">
+        <p14:creationId xmlns:p14="http://schemas.microsoft.com/office/powerpoint/2010/main" val="2901267193"/>
+      </p:ext>
+    </p:extLst>
+  </p:cSld>
+  <p:clrMapOvr>
+    <a:masterClrMapping/>
+  </p:clrMapOvr>
+</p:notes>
+</file>
+
+<file path=ppt/notesSlides/notesSlide8.xml><?xml version="1.0" encoding="utf-8"?>
+<p:notes xmlns:a="http://schemas.openxmlformats.org/drawingml/2006/main" xmlns:r="http://schemas.openxmlformats.org/officeDocument/2006/relationships" xmlns:p="http://schemas.openxmlformats.org/presentationml/2006/main">
+  <p:cSld>
+    <p:spTree>
+      <p:nvGrpSpPr>
+        <p:cNvPr id="1" name=""/>
+        <p:cNvGrpSpPr/>
+        <p:nvPr/>
+      </p:nvGrpSpPr>
+      <p:grpSpPr>
+        <a:xfrm>
+          <a:off x="0" y="0"/>
+          <a:ext cx="0" cy="0"/>
+          <a:chOff x="0" y="0"/>
+          <a:chExt cx="0" cy="0"/>
+        </a:xfrm>
+      </p:grpSpPr>
+      <p:sp>
+        <p:nvSpPr>
+          <p:cNvPr id="2" name="Slide Image Placeholder 1"/>
+          <p:cNvSpPr>
+            <a:spLocks noGrp="1" noRot="1" noChangeAspect="1"/>
+          </p:cNvSpPr>
+          <p:nvPr>
+            <p:ph type="sldImg"/>
+          </p:nvPr>
+        </p:nvSpPr>
+        <p:spPr/>
+      </p:sp>
+      <p:sp>
+        <p:nvSpPr>
+          <p:cNvPr id="3" name="Notes Placeholder 2"/>
+          <p:cNvSpPr>
+            <a:spLocks noGrp="1"/>
+          </p:cNvSpPr>
+          <p:nvPr>
+            <p:ph type="body" idx="1"/>
+          </p:nvPr>
+        </p:nvSpPr>
+        <p:spPr/>
+        <p:txBody>
+          <a:bodyPr/>
+          <a:lstStyle/>
+          <a:p>
+            <a:endParaRPr lang="en-US" dirty="0"/>
+          </a:p>
+        </p:txBody>
+      </p:sp>
+      <p:sp>
+        <p:nvSpPr>
+          <p:cNvPr id="4" name="Slide Number Placeholder 3"/>
+          <p:cNvSpPr>
+            <a:spLocks noGrp="1"/>
+          </p:cNvSpPr>
+          <p:nvPr>
+            <p:ph type="sldNum" sz="quarter" idx="5"/>
+          </p:nvPr>
+        </p:nvSpPr>
+        <p:spPr/>
+        <p:txBody>
+          <a:bodyPr/>
+          <a:lstStyle/>
+          <a:p>
+            <a:fld id="{6A4FF178-7F5C-4C53-AC97-DF4205D97146}" type="slidenum">
+              <a:rPr lang="de-CH" smtClean="0"/>
+              <a:pPr/>
+              <a:t>10</a:t>
+            </a:fld>
+            <a:endParaRPr lang="de-CH"/>
+          </a:p>
+        </p:txBody>
+      </p:sp>
+    </p:spTree>
+    <p:extLst>
+      <p:ext uri="{BB962C8B-B14F-4D97-AF65-F5344CB8AC3E}">
+        <p14:creationId xmlns:p14="http://schemas.microsoft.com/office/powerpoint/2010/main" val="2104428077"/>
+      </p:ext>
+    </p:extLst>
+  </p:cSld>
+  <p:clrMapOvr>
+    <a:masterClrMapping/>
+  </p:clrMapOvr>
+</p:notes>
+</file>
+
+<file path=ppt/notesSlides/notesSlide9.xml><?xml version="1.0" encoding="utf-8"?>
+<p:notes xmlns:a="http://schemas.openxmlformats.org/drawingml/2006/main" xmlns:r="http://schemas.openxmlformats.org/officeDocument/2006/relationships" xmlns:p="http://schemas.openxmlformats.org/presentationml/2006/main">
+  <p:cSld>
+    <p:spTree>
+      <p:nvGrpSpPr>
+        <p:cNvPr id="1" name=""/>
+        <p:cNvGrpSpPr/>
+        <p:nvPr/>
+      </p:nvGrpSpPr>
+      <p:grpSpPr>
+        <a:xfrm>
+          <a:off x="0" y="0"/>
+          <a:ext cx="0" cy="0"/>
+          <a:chOff x="0" y="0"/>
+          <a:chExt cx="0" cy="0"/>
+        </a:xfrm>
+      </p:grpSpPr>
+      <p:sp>
+        <p:nvSpPr>
+          <p:cNvPr id="2" name="Slide Image Placeholder 1"/>
+          <p:cNvSpPr>
+            <a:spLocks noGrp="1" noRot="1" noChangeAspect="1"/>
+          </p:cNvSpPr>
+          <p:nvPr>
+            <p:ph type="sldImg"/>
+          </p:nvPr>
+        </p:nvSpPr>
+        <p:spPr/>
+      </p:sp>
+      <p:sp>
+        <p:nvSpPr>
+          <p:cNvPr id="3" name="Notes Placeholder 2"/>
+          <p:cNvSpPr>
+            <a:spLocks noGrp="1"/>
+          </p:cNvSpPr>
+          <p:nvPr>
+            <p:ph type="body" idx="1"/>
+          </p:nvPr>
+        </p:nvSpPr>
+        <p:spPr/>
+        <p:txBody>
+          <a:bodyPr/>
+          <a:lstStyle/>
+          <a:p>
+            <a:endParaRPr lang="en-US" dirty="0"/>
+          </a:p>
+        </p:txBody>
+      </p:sp>
+      <p:sp>
+        <p:nvSpPr>
+          <p:cNvPr id="4" name="Slide Number Placeholder 3"/>
+          <p:cNvSpPr>
+            <a:spLocks noGrp="1"/>
+          </p:cNvSpPr>
+          <p:nvPr>
+            <p:ph type="sldNum" sz="quarter" idx="5"/>
+          </p:nvPr>
+        </p:nvSpPr>
+        <p:spPr/>
+        <p:txBody>
+          <a:bodyPr/>
+          <a:lstStyle/>
+          <a:p>
+            <a:fld id="{6A4FF178-7F5C-4C53-AC97-DF4205D97146}" type="slidenum">
+              <a:rPr lang="de-CH" smtClean="0"/>
+              <a:pPr/>
+              <a:t>11</a:t>
+            </a:fld>
+            <a:endParaRPr lang="de-CH"/>
+          </a:p>
+        </p:txBody>
+      </p:sp>
+    </p:spTree>
+    <p:extLst>
+      <p:ext uri="{BB962C8B-B14F-4D97-AF65-F5344CB8AC3E}">
+        <p14:creationId xmlns:p14="http://schemas.microsoft.com/office/powerpoint/2010/main" val="3245021638"/>
       </p:ext>
     </p:extLst>
   </p:cSld>
@@ -14431,9 +15214,808 @@
   <p:clrMapOvr>
     <a:masterClrMapping/>
   </p:clrMapOvr>
-  <p:transition spd="slow">
-    <p:push dir="u"/>
-  </p:transition>
+  <mc:AlternateContent xmlns:mc="http://schemas.openxmlformats.org/markup-compatibility/2006">
+    <mc:Choice xmlns:p14="http://schemas.microsoft.com/office/powerpoint/2010/main" Requires="p14">
+      <p:transition p14:dur="0"/>
+    </mc:Choice>
+    <mc:Fallback>
+      <p:transition/>
+    </mc:Fallback>
+  </mc:AlternateContent>
+</p:sld>
+</file>
+
+<file path=ppt/slides/slide10.xml><?xml version="1.0" encoding="utf-8"?>
+<p:sld xmlns:a="http://schemas.openxmlformats.org/drawingml/2006/main" xmlns:r="http://schemas.openxmlformats.org/officeDocument/2006/relationships" xmlns:p="http://schemas.openxmlformats.org/presentationml/2006/main">
+  <p:cSld>
+    <p:spTree>
+      <p:nvGrpSpPr>
+        <p:cNvPr id="1" name=""/>
+        <p:cNvGrpSpPr/>
+        <p:nvPr/>
+      </p:nvGrpSpPr>
+      <p:grpSpPr>
+        <a:xfrm>
+          <a:off x="0" y="0"/>
+          <a:ext cx="0" cy="0"/>
+          <a:chOff x="0" y="0"/>
+          <a:chExt cx="0" cy="0"/>
+        </a:xfrm>
+      </p:grpSpPr>
+      <p:sp>
+        <p:nvSpPr>
+          <p:cNvPr id="3" name="Title 2">
+            <a:extLst>
+              <a:ext uri="{FF2B5EF4-FFF2-40B4-BE49-F238E27FC236}">
+                <a16:creationId xmlns:a16="http://schemas.microsoft.com/office/drawing/2014/main" id="{302E7985-D05A-D411-863C-74F6A1A47A4D}"/>
+              </a:ext>
+            </a:extLst>
+          </p:cNvPr>
+          <p:cNvSpPr>
+            <a:spLocks noGrp="1"/>
+          </p:cNvSpPr>
+          <p:nvPr>
+            <p:ph type="title"/>
+          </p:nvPr>
+        </p:nvSpPr>
+        <p:spPr/>
+        <p:txBody>
+          <a:bodyPr/>
+          <a:lstStyle/>
+          <a:p>
+            <a:r>
+              <a:rPr lang="en-US" dirty="0"/>
+              <a:t>Sign Up UI</a:t>
+            </a:r>
+          </a:p>
+        </p:txBody>
+      </p:sp>
+      <p:pic>
+        <p:nvPicPr>
+          <p:cNvPr id="5" name="Picture 4">
+            <a:extLst>
+              <a:ext uri="{FF2B5EF4-FFF2-40B4-BE49-F238E27FC236}">
+                <a16:creationId xmlns:a16="http://schemas.microsoft.com/office/drawing/2014/main" id="{F0EEB8C0-5645-87B9-584A-161C06B31A01}"/>
+              </a:ext>
+            </a:extLst>
+          </p:cNvPr>
+          <p:cNvPicPr>
+            <a:picLocks noChangeAspect="1"/>
+          </p:cNvPicPr>
+          <p:nvPr/>
+        </p:nvPicPr>
+        <p:blipFill>
+          <a:blip r:embed="rId3"/>
+          <a:stretch>
+            <a:fillRect/>
+          </a:stretch>
+        </p:blipFill>
+        <p:spPr>
+          <a:xfrm>
+            <a:off x="437360" y="1098550"/>
+            <a:ext cx="5195428" cy="3463618"/>
+          </a:xfrm>
+          <a:prstGeom prst="rect">
+            <a:avLst/>
+          </a:prstGeom>
+        </p:spPr>
+      </p:pic>
+      <p:pic>
+        <p:nvPicPr>
+          <p:cNvPr id="8" name="Picture 7">
+            <a:extLst>
+              <a:ext uri="{FF2B5EF4-FFF2-40B4-BE49-F238E27FC236}">
+                <a16:creationId xmlns:a16="http://schemas.microsoft.com/office/drawing/2014/main" id="{81B998A5-5D34-D19E-D42E-0AD00C19E1FA}"/>
+              </a:ext>
+            </a:extLst>
+          </p:cNvPr>
+          <p:cNvPicPr>
+            <a:picLocks noChangeAspect="1"/>
+          </p:cNvPicPr>
+          <p:nvPr/>
+        </p:nvPicPr>
+        <p:blipFill>
+          <a:blip r:embed="rId4"/>
+          <a:stretch>
+            <a:fillRect/>
+          </a:stretch>
+        </p:blipFill>
+        <p:spPr>
+          <a:xfrm>
+            <a:off x="7410450" y="1098550"/>
+            <a:ext cx="4344190" cy="5246224"/>
+          </a:xfrm>
+          <a:prstGeom prst="rect">
+            <a:avLst/>
+          </a:prstGeom>
+        </p:spPr>
+      </p:pic>
+    </p:spTree>
+    <p:extLst>
+      <p:ext uri="{BB962C8B-B14F-4D97-AF65-F5344CB8AC3E}">
+        <p14:creationId xmlns:p14="http://schemas.microsoft.com/office/powerpoint/2010/main" val="1979827957"/>
+      </p:ext>
+    </p:extLst>
+  </p:cSld>
+  <p:clrMapOvr>
+    <a:masterClrMapping/>
+  </p:clrMapOvr>
+  <mc:AlternateContent xmlns:mc="http://schemas.openxmlformats.org/markup-compatibility/2006">
+    <mc:Choice xmlns:p14="http://schemas.microsoft.com/office/powerpoint/2010/main" Requires="p14">
+      <p:transition p14:dur="0"/>
+    </mc:Choice>
+    <mc:Fallback>
+      <p:transition/>
+    </mc:Fallback>
+  </mc:AlternateContent>
+</p:sld>
+</file>
+
+<file path=ppt/slides/slide11.xml><?xml version="1.0" encoding="utf-8"?>
+<p:sld xmlns:a="http://schemas.openxmlformats.org/drawingml/2006/main" xmlns:r="http://schemas.openxmlformats.org/officeDocument/2006/relationships" xmlns:p="http://schemas.openxmlformats.org/presentationml/2006/main">
+  <p:cSld>
+    <p:spTree>
+      <p:nvGrpSpPr>
+        <p:cNvPr id="1" name=""/>
+        <p:cNvGrpSpPr/>
+        <p:nvPr/>
+      </p:nvGrpSpPr>
+      <p:grpSpPr>
+        <a:xfrm>
+          <a:off x="0" y="0"/>
+          <a:ext cx="0" cy="0"/>
+          <a:chOff x="0" y="0"/>
+          <a:chExt cx="0" cy="0"/>
+        </a:xfrm>
+      </p:grpSpPr>
+      <p:sp>
+        <p:nvSpPr>
+          <p:cNvPr id="3" name="Title 2">
+            <a:extLst>
+              <a:ext uri="{FF2B5EF4-FFF2-40B4-BE49-F238E27FC236}">
+                <a16:creationId xmlns:a16="http://schemas.microsoft.com/office/drawing/2014/main" id="{302E7985-D05A-D411-863C-74F6A1A47A4D}"/>
+              </a:ext>
+            </a:extLst>
+          </p:cNvPr>
+          <p:cNvSpPr>
+            <a:spLocks noGrp="1"/>
+          </p:cNvSpPr>
+          <p:nvPr>
+            <p:ph type="title"/>
+          </p:nvPr>
+        </p:nvSpPr>
+        <p:spPr/>
+        <p:txBody>
+          <a:bodyPr/>
+          <a:lstStyle/>
+          <a:p>
+            <a:r>
+              <a:rPr lang="en-US" dirty="0"/>
+              <a:t>Sign Up UI</a:t>
+            </a:r>
+          </a:p>
+        </p:txBody>
+      </p:sp>
+      <p:pic>
+        <p:nvPicPr>
+          <p:cNvPr id="4" name="Picture 3">
+            <a:extLst>
+              <a:ext uri="{FF2B5EF4-FFF2-40B4-BE49-F238E27FC236}">
+                <a16:creationId xmlns:a16="http://schemas.microsoft.com/office/drawing/2014/main" id="{451FB2DD-BDEC-E7E9-2E55-F09C2573AE6A}"/>
+              </a:ext>
+            </a:extLst>
+          </p:cNvPr>
+          <p:cNvPicPr>
+            <a:picLocks noChangeAspect="1"/>
+          </p:cNvPicPr>
+          <p:nvPr/>
+        </p:nvPicPr>
+        <p:blipFill>
+          <a:blip r:embed="rId3"/>
+          <a:stretch>
+            <a:fillRect/>
+          </a:stretch>
+        </p:blipFill>
+        <p:spPr>
+          <a:xfrm>
+            <a:off x="428625" y="1098550"/>
+            <a:ext cx="4352926" cy="5314782"/>
+          </a:xfrm>
+          <a:prstGeom prst="rect">
+            <a:avLst/>
+          </a:prstGeom>
+        </p:spPr>
+      </p:pic>
+      <p:pic>
+        <p:nvPicPr>
+          <p:cNvPr id="7" name="Picture 6">
+            <a:extLst>
+              <a:ext uri="{FF2B5EF4-FFF2-40B4-BE49-F238E27FC236}">
+                <a16:creationId xmlns:a16="http://schemas.microsoft.com/office/drawing/2014/main" id="{B4F69CBB-AC8D-CBA1-16A9-520735D456C9}"/>
+              </a:ext>
+            </a:extLst>
+          </p:cNvPr>
+          <p:cNvPicPr>
+            <a:picLocks noChangeAspect="1"/>
+          </p:cNvPicPr>
+          <p:nvPr/>
+        </p:nvPicPr>
+        <p:blipFill>
+          <a:blip r:embed="rId4"/>
+          <a:stretch>
+            <a:fillRect/>
+          </a:stretch>
+        </p:blipFill>
+        <p:spPr>
+          <a:xfrm>
+            <a:off x="6085066" y="1098551"/>
+            <a:ext cx="5678309" cy="5314781"/>
+          </a:xfrm>
+          <a:prstGeom prst="rect">
+            <a:avLst/>
+          </a:prstGeom>
+        </p:spPr>
+      </p:pic>
+    </p:spTree>
+    <p:extLst>
+      <p:ext uri="{BB962C8B-B14F-4D97-AF65-F5344CB8AC3E}">
+        <p14:creationId xmlns:p14="http://schemas.microsoft.com/office/powerpoint/2010/main" val="1079944633"/>
+      </p:ext>
+    </p:extLst>
+  </p:cSld>
+  <p:clrMapOvr>
+    <a:masterClrMapping/>
+  </p:clrMapOvr>
+  <mc:AlternateContent xmlns:mc="http://schemas.openxmlformats.org/markup-compatibility/2006">
+    <mc:Choice xmlns:p14="http://schemas.microsoft.com/office/powerpoint/2010/main" Requires="p14">
+      <p:transition p14:dur="0"/>
+    </mc:Choice>
+    <mc:Fallback>
+      <p:transition/>
+    </mc:Fallback>
+  </mc:AlternateContent>
+</p:sld>
+</file>
+
+<file path=ppt/slides/slide12.xml><?xml version="1.0" encoding="utf-8"?>
+<p:sld xmlns:a="http://schemas.openxmlformats.org/drawingml/2006/main" xmlns:r="http://schemas.openxmlformats.org/officeDocument/2006/relationships" xmlns:p="http://schemas.openxmlformats.org/presentationml/2006/main">
+  <p:cSld>
+    <p:spTree>
+      <p:nvGrpSpPr>
+        <p:cNvPr id="1" name=""/>
+        <p:cNvGrpSpPr/>
+        <p:nvPr/>
+      </p:nvGrpSpPr>
+      <p:grpSpPr>
+        <a:xfrm>
+          <a:off x="0" y="0"/>
+          <a:ext cx="0" cy="0"/>
+          <a:chOff x="0" y="0"/>
+          <a:chExt cx="0" cy="0"/>
+        </a:xfrm>
+      </p:grpSpPr>
+      <p:sp>
+        <p:nvSpPr>
+          <p:cNvPr id="3" name="Title 2">
+            <a:extLst>
+              <a:ext uri="{FF2B5EF4-FFF2-40B4-BE49-F238E27FC236}">
+                <a16:creationId xmlns:a16="http://schemas.microsoft.com/office/drawing/2014/main" id="{302E7985-D05A-D411-863C-74F6A1A47A4D}"/>
+              </a:ext>
+            </a:extLst>
+          </p:cNvPr>
+          <p:cNvSpPr>
+            <a:spLocks noGrp="1"/>
+          </p:cNvSpPr>
+          <p:nvPr>
+            <p:ph type="title"/>
+          </p:nvPr>
+        </p:nvSpPr>
+        <p:spPr/>
+        <p:txBody>
+          <a:bodyPr/>
+          <a:lstStyle/>
+          <a:p>
+            <a:r>
+              <a:rPr lang="en-US" dirty="0"/>
+              <a:t>Forgot Password UI</a:t>
+            </a:r>
+          </a:p>
+        </p:txBody>
+      </p:sp>
+      <p:pic>
+        <p:nvPicPr>
+          <p:cNvPr id="10" name="Picture 9">
+            <a:extLst>
+              <a:ext uri="{FF2B5EF4-FFF2-40B4-BE49-F238E27FC236}">
+                <a16:creationId xmlns:a16="http://schemas.microsoft.com/office/drawing/2014/main" id="{A54274E8-0145-EBF0-AEE8-ACF1A7EA6562}"/>
+              </a:ext>
+            </a:extLst>
+          </p:cNvPr>
+          <p:cNvPicPr>
+            <a:picLocks noChangeAspect="1"/>
+          </p:cNvPicPr>
+          <p:nvPr/>
+        </p:nvPicPr>
+        <p:blipFill>
+          <a:blip r:embed="rId3"/>
+          <a:stretch>
+            <a:fillRect/>
+          </a:stretch>
+        </p:blipFill>
+        <p:spPr>
+          <a:xfrm>
+            <a:off x="431999" y="1098551"/>
+            <a:ext cx="4006651" cy="5317098"/>
+          </a:xfrm>
+          <a:prstGeom prst="rect">
+            <a:avLst/>
+          </a:prstGeom>
+        </p:spPr>
+      </p:pic>
+      <p:pic>
+        <p:nvPicPr>
+          <p:cNvPr id="4" name="Picture 3">
+            <a:extLst>
+              <a:ext uri="{FF2B5EF4-FFF2-40B4-BE49-F238E27FC236}">
+                <a16:creationId xmlns:a16="http://schemas.microsoft.com/office/drawing/2014/main" id="{154FEC8F-BC1E-E567-BE2D-B031E71B74AF}"/>
+              </a:ext>
+            </a:extLst>
+          </p:cNvPr>
+          <p:cNvPicPr>
+            <a:picLocks noChangeAspect="1"/>
+          </p:cNvPicPr>
+          <p:nvPr/>
+        </p:nvPicPr>
+        <p:blipFill>
+          <a:blip r:embed="rId4"/>
+          <a:stretch>
+            <a:fillRect/>
+          </a:stretch>
+        </p:blipFill>
+        <p:spPr>
+          <a:xfrm>
+            <a:off x="6608044" y="1098000"/>
+            <a:ext cx="5153744" cy="3658111"/>
+          </a:xfrm>
+          <a:prstGeom prst="rect">
+            <a:avLst/>
+          </a:prstGeom>
+        </p:spPr>
+      </p:pic>
+    </p:spTree>
+    <p:extLst>
+      <p:ext uri="{BB962C8B-B14F-4D97-AF65-F5344CB8AC3E}">
+        <p14:creationId xmlns:p14="http://schemas.microsoft.com/office/powerpoint/2010/main" val="3487818123"/>
+      </p:ext>
+    </p:extLst>
+  </p:cSld>
+  <p:clrMapOvr>
+    <a:masterClrMapping/>
+  </p:clrMapOvr>
+  <mc:AlternateContent xmlns:mc="http://schemas.openxmlformats.org/markup-compatibility/2006">
+    <mc:Choice xmlns:p14="http://schemas.microsoft.com/office/powerpoint/2010/main" Requires="p14">
+      <p:transition p14:dur="0"/>
+    </mc:Choice>
+    <mc:Fallback>
+      <p:transition/>
+    </mc:Fallback>
+  </mc:AlternateContent>
+</p:sld>
+</file>
+
+<file path=ppt/slides/slide13.xml><?xml version="1.0" encoding="utf-8"?>
+<p:sld xmlns:a="http://schemas.openxmlformats.org/drawingml/2006/main" xmlns:r="http://schemas.openxmlformats.org/officeDocument/2006/relationships" xmlns:p="http://schemas.openxmlformats.org/presentationml/2006/main">
+  <p:cSld>
+    <p:spTree>
+      <p:nvGrpSpPr>
+        <p:cNvPr id="1" name=""/>
+        <p:cNvGrpSpPr/>
+        <p:nvPr/>
+      </p:nvGrpSpPr>
+      <p:grpSpPr>
+        <a:xfrm>
+          <a:off x="0" y="0"/>
+          <a:ext cx="0" cy="0"/>
+          <a:chOff x="0" y="0"/>
+          <a:chExt cx="0" cy="0"/>
+        </a:xfrm>
+      </p:grpSpPr>
+      <p:sp>
+        <p:nvSpPr>
+          <p:cNvPr id="3" name="Title 2">
+            <a:extLst>
+              <a:ext uri="{FF2B5EF4-FFF2-40B4-BE49-F238E27FC236}">
+                <a16:creationId xmlns:a16="http://schemas.microsoft.com/office/drawing/2014/main" id="{302E7985-D05A-D411-863C-74F6A1A47A4D}"/>
+              </a:ext>
+            </a:extLst>
+          </p:cNvPr>
+          <p:cNvSpPr>
+            <a:spLocks noGrp="1"/>
+          </p:cNvSpPr>
+          <p:nvPr>
+            <p:ph type="title"/>
+          </p:nvPr>
+        </p:nvSpPr>
+        <p:spPr/>
+        <p:txBody>
+          <a:bodyPr/>
+          <a:lstStyle/>
+          <a:p>
+            <a:r>
+              <a:rPr lang="en-US" dirty="0"/>
+              <a:t>Forgot Password UI</a:t>
+            </a:r>
+          </a:p>
+        </p:txBody>
+      </p:sp>
+      <p:pic>
+        <p:nvPicPr>
+          <p:cNvPr id="5" name="Picture 4">
+            <a:extLst>
+              <a:ext uri="{FF2B5EF4-FFF2-40B4-BE49-F238E27FC236}">
+                <a16:creationId xmlns:a16="http://schemas.microsoft.com/office/drawing/2014/main" id="{710A2F9B-9B1B-2D68-4625-36CD67D74208}"/>
+              </a:ext>
+            </a:extLst>
+          </p:cNvPr>
+          <p:cNvPicPr>
+            <a:picLocks noChangeAspect="1"/>
+          </p:cNvPicPr>
+          <p:nvPr/>
+        </p:nvPicPr>
+        <p:blipFill>
+          <a:blip r:embed="rId3"/>
+          <a:stretch>
+            <a:fillRect/>
+          </a:stretch>
+        </p:blipFill>
+        <p:spPr>
+          <a:xfrm>
+            <a:off x="428625" y="1107527"/>
+            <a:ext cx="5106113" cy="3648584"/>
+          </a:xfrm>
+          <a:prstGeom prst="rect">
+            <a:avLst/>
+          </a:prstGeom>
+        </p:spPr>
+      </p:pic>
+      <p:pic>
+        <p:nvPicPr>
+          <p:cNvPr id="7" name="Picture 6">
+            <a:extLst>
+              <a:ext uri="{FF2B5EF4-FFF2-40B4-BE49-F238E27FC236}">
+                <a16:creationId xmlns:a16="http://schemas.microsoft.com/office/drawing/2014/main" id="{31ABC9CF-CAFB-85C6-A139-CEF2CAC490DC}"/>
+              </a:ext>
+            </a:extLst>
+          </p:cNvPr>
+          <p:cNvPicPr>
+            <a:picLocks noChangeAspect="1"/>
+          </p:cNvPicPr>
+          <p:nvPr/>
+        </p:nvPicPr>
+        <p:blipFill>
+          <a:blip r:embed="rId4"/>
+          <a:stretch>
+            <a:fillRect/>
+          </a:stretch>
+        </p:blipFill>
+        <p:spPr>
+          <a:xfrm>
+            <a:off x="6657264" y="1098000"/>
+            <a:ext cx="5115639" cy="4229690"/>
+          </a:xfrm>
+          <a:prstGeom prst="rect">
+            <a:avLst/>
+          </a:prstGeom>
+        </p:spPr>
+      </p:pic>
+    </p:spTree>
+    <p:extLst>
+      <p:ext uri="{BB962C8B-B14F-4D97-AF65-F5344CB8AC3E}">
+        <p14:creationId xmlns:p14="http://schemas.microsoft.com/office/powerpoint/2010/main" val="3076225331"/>
+      </p:ext>
+    </p:extLst>
+  </p:cSld>
+  <p:clrMapOvr>
+    <a:masterClrMapping/>
+  </p:clrMapOvr>
+  <mc:AlternateContent xmlns:mc="http://schemas.openxmlformats.org/markup-compatibility/2006">
+    <mc:Choice xmlns:p14="http://schemas.microsoft.com/office/powerpoint/2010/main" Requires="p14">
+      <p:transition p14:dur="0"/>
+    </mc:Choice>
+    <mc:Fallback>
+      <p:transition/>
+    </mc:Fallback>
+  </mc:AlternateContent>
+</p:sld>
+</file>
+
+<file path=ppt/slides/slide14.xml><?xml version="1.0" encoding="utf-8"?>
+<p:sld xmlns:a="http://schemas.openxmlformats.org/drawingml/2006/main" xmlns:r="http://schemas.openxmlformats.org/officeDocument/2006/relationships" xmlns:p="http://schemas.openxmlformats.org/presentationml/2006/main">
+  <p:cSld>
+    <p:spTree>
+      <p:nvGrpSpPr>
+        <p:cNvPr id="1" name=""/>
+        <p:cNvGrpSpPr/>
+        <p:nvPr/>
+      </p:nvGrpSpPr>
+      <p:grpSpPr>
+        <a:xfrm>
+          <a:off x="0" y="0"/>
+          <a:ext cx="0" cy="0"/>
+          <a:chOff x="0" y="0"/>
+          <a:chExt cx="0" cy="0"/>
+        </a:xfrm>
+      </p:grpSpPr>
+      <p:sp>
+        <p:nvSpPr>
+          <p:cNvPr id="3" name="Title 2">
+            <a:extLst>
+              <a:ext uri="{FF2B5EF4-FFF2-40B4-BE49-F238E27FC236}">
+                <a16:creationId xmlns:a16="http://schemas.microsoft.com/office/drawing/2014/main" id="{302E7985-D05A-D411-863C-74F6A1A47A4D}"/>
+              </a:ext>
+            </a:extLst>
+          </p:cNvPr>
+          <p:cNvSpPr>
+            <a:spLocks noGrp="1"/>
+          </p:cNvSpPr>
+          <p:nvPr>
+            <p:ph type="title"/>
+          </p:nvPr>
+        </p:nvSpPr>
+        <p:spPr/>
+        <p:txBody>
+          <a:bodyPr/>
+          <a:lstStyle/>
+          <a:p>
+            <a:r>
+              <a:rPr lang="en-US" dirty="0"/>
+              <a:t>Forgot Password UI</a:t>
+            </a:r>
+          </a:p>
+        </p:txBody>
+      </p:sp>
+      <p:pic>
+        <p:nvPicPr>
+          <p:cNvPr id="11" name="Picture 10">
+            <a:extLst>
+              <a:ext uri="{FF2B5EF4-FFF2-40B4-BE49-F238E27FC236}">
+                <a16:creationId xmlns:a16="http://schemas.microsoft.com/office/drawing/2014/main" id="{5F113BFA-688A-B710-6BFB-8C3B48863D87}"/>
+              </a:ext>
+            </a:extLst>
+          </p:cNvPr>
+          <p:cNvPicPr>
+            <a:picLocks noChangeAspect="1"/>
+          </p:cNvPicPr>
+          <p:nvPr/>
+        </p:nvPicPr>
+        <p:blipFill>
+          <a:blip r:embed="rId3"/>
+          <a:stretch>
+            <a:fillRect/>
+          </a:stretch>
+        </p:blipFill>
+        <p:spPr>
+          <a:xfrm>
+            <a:off x="428625" y="1098550"/>
+            <a:ext cx="5706271" cy="4934639"/>
+          </a:xfrm>
+          <a:prstGeom prst="rect">
+            <a:avLst/>
+          </a:prstGeom>
+        </p:spPr>
+      </p:pic>
+      <p:pic>
+        <p:nvPicPr>
+          <p:cNvPr id="13" name="Picture 12">
+            <a:extLst>
+              <a:ext uri="{FF2B5EF4-FFF2-40B4-BE49-F238E27FC236}">
+                <a16:creationId xmlns:a16="http://schemas.microsoft.com/office/drawing/2014/main" id="{90DF5553-AC7F-AFA5-7ECC-028222E94FFE}"/>
+              </a:ext>
+            </a:extLst>
+          </p:cNvPr>
+          <p:cNvPicPr>
+            <a:picLocks noChangeAspect="1"/>
+          </p:cNvPicPr>
+          <p:nvPr/>
+        </p:nvPicPr>
+        <p:blipFill>
+          <a:blip r:embed="rId4"/>
+          <a:stretch>
+            <a:fillRect/>
+          </a:stretch>
+        </p:blipFill>
+        <p:spPr>
+          <a:xfrm>
+            <a:off x="6579465" y="1098000"/>
+            <a:ext cx="5182323" cy="3667637"/>
+          </a:xfrm>
+          <a:prstGeom prst="rect">
+            <a:avLst/>
+          </a:prstGeom>
+        </p:spPr>
+      </p:pic>
+    </p:spTree>
+    <p:extLst>
+      <p:ext uri="{BB962C8B-B14F-4D97-AF65-F5344CB8AC3E}">
+        <p14:creationId xmlns:p14="http://schemas.microsoft.com/office/powerpoint/2010/main" val="2772746588"/>
+      </p:ext>
+    </p:extLst>
+  </p:cSld>
+  <p:clrMapOvr>
+    <a:masterClrMapping/>
+  </p:clrMapOvr>
+  <mc:AlternateContent xmlns:mc="http://schemas.openxmlformats.org/markup-compatibility/2006">
+    <mc:Choice xmlns:p14="http://schemas.microsoft.com/office/powerpoint/2010/main" Requires="p14">
+      <p:transition p14:dur="0"/>
+    </mc:Choice>
+    <mc:Fallback>
+      <p:transition/>
+    </mc:Fallback>
+  </mc:AlternateContent>
+</p:sld>
+</file>
+
+<file path=ppt/slides/slide15.xml><?xml version="1.0" encoding="utf-8"?>
+<p:sld xmlns:a="http://schemas.openxmlformats.org/drawingml/2006/main" xmlns:r="http://schemas.openxmlformats.org/officeDocument/2006/relationships" xmlns:p="http://schemas.openxmlformats.org/presentationml/2006/main">
+  <p:cSld>
+    <p:spTree>
+      <p:nvGrpSpPr>
+        <p:cNvPr id="1" name=""/>
+        <p:cNvGrpSpPr/>
+        <p:nvPr/>
+      </p:nvGrpSpPr>
+      <p:grpSpPr>
+        <a:xfrm>
+          <a:off x="0" y="0"/>
+          <a:ext cx="0" cy="0"/>
+          <a:chOff x="0" y="0"/>
+          <a:chExt cx="0" cy="0"/>
+        </a:xfrm>
+      </p:grpSpPr>
+      <p:sp>
+        <p:nvSpPr>
+          <p:cNvPr id="3" name="Title 2">
+            <a:extLst>
+              <a:ext uri="{FF2B5EF4-FFF2-40B4-BE49-F238E27FC236}">
+                <a16:creationId xmlns:a16="http://schemas.microsoft.com/office/drawing/2014/main" id="{302E7985-D05A-D411-863C-74F6A1A47A4D}"/>
+              </a:ext>
+            </a:extLst>
+          </p:cNvPr>
+          <p:cNvSpPr>
+            <a:spLocks noGrp="1"/>
+          </p:cNvSpPr>
+          <p:nvPr>
+            <p:ph type="title"/>
+          </p:nvPr>
+        </p:nvSpPr>
+        <p:spPr/>
+        <p:txBody>
+          <a:bodyPr/>
+          <a:lstStyle/>
+          <a:p>
+            <a:r>
+              <a:rPr lang="en-US" dirty="0"/>
+              <a:t>Forgot Password UI</a:t>
+            </a:r>
+          </a:p>
+        </p:txBody>
+      </p:sp>
+      <p:pic>
+        <p:nvPicPr>
+          <p:cNvPr id="2" name="Picture 1">
+            <a:extLst>
+              <a:ext uri="{FF2B5EF4-FFF2-40B4-BE49-F238E27FC236}">
+                <a16:creationId xmlns:a16="http://schemas.microsoft.com/office/drawing/2014/main" id="{7E12CBF8-E6D6-2167-47B7-5A7ACF01FBC3}"/>
+              </a:ext>
+            </a:extLst>
+          </p:cNvPr>
+          <p:cNvPicPr>
+            <a:picLocks noChangeAspect="1"/>
+          </p:cNvPicPr>
+          <p:nvPr/>
+        </p:nvPicPr>
+        <p:blipFill>
+          <a:blip r:embed="rId3"/>
+          <a:stretch>
+            <a:fillRect/>
+          </a:stretch>
+        </p:blipFill>
+        <p:spPr>
+          <a:xfrm>
+            <a:off x="428625" y="1117052"/>
+            <a:ext cx="5115639" cy="3629532"/>
+          </a:xfrm>
+          <a:prstGeom prst="rect">
+            <a:avLst/>
+          </a:prstGeom>
+        </p:spPr>
+      </p:pic>
+      <p:pic>
+        <p:nvPicPr>
+          <p:cNvPr id="5" name="Picture 4">
+            <a:extLst>
+              <a:ext uri="{FF2B5EF4-FFF2-40B4-BE49-F238E27FC236}">
+                <a16:creationId xmlns:a16="http://schemas.microsoft.com/office/drawing/2014/main" id="{68CC322C-C9ED-004D-4746-4E4D3BE79CAF}"/>
+              </a:ext>
+            </a:extLst>
+          </p:cNvPr>
+          <p:cNvPicPr>
+            <a:picLocks noChangeAspect="1"/>
+          </p:cNvPicPr>
+          <p:nvPr/>
+        </p:nvPicPr>
+        <p:blipFill>
+          <a:blip r:embed="rId4"/>
+          <a:stretch>
+            <a:fillRect/>
+          </a:stretch>
+        </p:blipFill>
+        <p:spPr>
+          <a:xfrm>
+            <a:off x="6293517" y="1117052"/>
+            <a:ext cx="5469858" cy="3629532"/>
+          </a:xfrm>
+          <a:prstGeom prst="rect">
+            <a:avLst/>
+          </a:prstGeom>
+        </p:spPr>
+      </p:pic>
+    </p:spTree>
+    <p:extLst>
+      <p:ext uri="{BB962C8B-B14F-4D97-AF65-F5344CB8AC3E}">
+        <p14:creationId xmlns:p14="http://schemas.microsoft.com/office/powerpoint/2010/main" val="2277961254"/>
+      </p:ext>
+    </p:extLst>
+  </p:cSld>
+  <p:clrMapOvr>
+    <a:masterClrMapping/>
+  </p:clrMapOvr>
+  <mc:AlternateContent xmlns:mc="http://schemas.openxmlformats.org/markup-compatibility/2006">
+    <mc:Choice xmlns:p14="http://schemas.microsoft.com/office/powerpoint/2010/main" Requires="p14">
+      <p:transition p14:dur="0"/>
+    </mc:Choice>
+    <mc:Fallback>
+      <p:transition/>
+    </mc:Fallback>
+  </mc:AlternateContent>
+</p:sld>
+</file>
+
+<file path=ppt/slides/slide16.xml><?xml version="1.0" encoding="utf-8"?>
+<p:sld xmlns:a="http://schemas.openxmlformats.org/drawingml/2006/main" xmlns:r="http://schemas.openxmlformats.org/officeDocument/2006/relationships" xmlns:p="http://schemas.openxmlformats.org/presentationml/2006/main">
+  <p:cSld>
+    <p:spTree>
+      <p:nvGrpSpPr>
+        <p:cNvPr id="1" name=""/>
+        <p:cNvGrpSpPr/>
+        <p:nvPr/>
+      </p:nvGrpSpPr>
+      <p:grpSpPr>
+        <a:xfrm>
+          <a:off x="0" y="0"/>
+          <a:ext cx="0" cy="0"/>
+          <a:chOff x="0" y="0"/>
+          <a:chExt cx="0" cy="0"/>
+        </a:xfrm>
+      </p:grpSpPr>
+    </p:spTree>
+    <p:extLst>
+      <p:ext uri="{BB962C8B-B14F-4D97-AF65-F5344CB8AC3E}">
+        <p14:creationId xmlns:p14="http://schemas.microsoft.com/office/powerpoint/2010/main" val="2850996949"/>
+      </p:ext>
+    </p:extLst>
+  </p:cSld>
+  <p:clrMapOvr>
+    <a:masterClrMapping/>
+  </p:clrMapOvr>
+  <mc:AlternateContent xmlns:mc="http://schemas.openxmlformats.org/markup-compatibility/2006">
+    <mc:Choice xmlns:p14="http://schemas.microsoft.com/office/powerpoint/2010/main" Requires="p14">
+      <p:transition p14:dur="0"/>
+    </mc:Choice>
+    <mc:Fallback>
+      <p:transition/>
+    </mc:Fallback>
+  </mc:AlternateContent>
 </p:sld>
 </file>
 
@@ -14557,9 +16139,14 @@
   <p:clrMapOvr>
     <a:masterClrMapping/>
   </p:clrMapOvr>
-  <p:transition spd="slow">
-    <p:push dir="u"/>
-  </p:transition>
+  <mc:AlternateContent xmlns:mc="http://schemas.openxmlformats.org/markup-compatibility/2006">
+    <mc:Choice xmlns:p14="http://schemas.microsoft.com/office/powerpoint/2010/main" Requires="p14">
+      <p:transition p14:dur="0"/>
+    </mc:Choice>
+    <mc:Fallback>
+      <p:transition/>
+    </mc:Fallback>
+  </mc:AlternateContent>
 </p:sld>
 </file>
 
@@ -14730,204 +16317,13 @@
           <a:lstStyle/>
           <a:p>
             <a:r>
-              <a:rPr lang="en-CH" noProof="0" dirty="0"/>
-              <a:t>Presentation title</a:t>
-            </a:r>
-            <a:br>
-              <a:rPr lang="en-GB" noProof="0" dirty="0"/>
-            </a:br>
-            <a:r>
-              <a:rPr lang="en-CH" noProof="0" dirty="0"/>
-              <a:t>with customer logo</a:t>
+              <a:rPr lang="en-US" noProof="0" dirty="0"/>
+              <a:t>Authentication of Inflow</a:t>
             </a:r>
             <a:endParaRPr lang="en-GB" noProof="0" dirty="0"/>
           </a:p>
         </p:txBody>
       </p:sp>
-      <p:sp>
-        <p:nvSpPr>
-          <p:cNvPr id="10" name="Text Placeholder 9">
-            <a:extLst>
-              <a:ext uri="{FF2B5EF4-FFF2-40B4-BE49-F238E27FC236}">
-                <a16:creationId xmlns:a16="http://schemas.microsoft.com/office/drawing/2014/main" id="{FC76990F-B249-6611-0800-1DA433F97A5D}"/>
-              </a:ext>
-            </a:extLst>
-          </p:cNvPr>
-          <p:cNvSpPr>
-            <a:spLocks noGrp="1"/>
-          </p:cNvSpPr>
-          <p:nvPr>
-            <p:ph type="body" sz="quarter" idx="17"/>
-          </p:nvPr>
-        </p:nvSpPr>
-        <p:spPr/>
-        <p:txBody>
-          <a:bodyPr/>
-          <a:lstStyle/>
-          <a:p>
-            <a:endParaRPr lang="de-CH"/>
-          </a:p>
-        </p:txBody>
-      </p:sp>
-      <p:grpSp>
-        <p:nvGrpSpPr>
-          <p:cNvPr id="13" name="Group 12">
-            <a:extLst>
-              <a:ext uri="{FF2B5EF4-FFF2-40B4-BE49-F238E27FC236}">
-                <a16:creationId xmlns:a16="http://schemas.microsoft.com/office/drawing/2014/main" id="{DEC3FBF0-6FE4-4ED5-97F7-BC43A1D2912A}"/>
-              </a:ext>
-            </a:extLst>
-          </p:cNvPr>
-          <p:cNvGrpSpPr/>
-          <p:nvPr/>
-        </p:nvGrpSpPr>
-        <p:grpSpPr>
-          <a:xfrm>
-            <a:off x="9595831" y="2346866"/>
-            <a:ext cx="1736339" cy="526268"/>
-            <a:chOff x="8343600" y="2412129"/>
-            <a:chExt cx="2315118" cy="701691"/>
-          </a:xfrm>
-        </p:grpSpPr>
-        <p:pic>
-          <p:nvPicPr>
-            <p:cNvPr id="14" name="Graphic 13">
-              <a:extLst>
-                <a:ext uri="{FF2B5EF4-FFF2-40B4-BE49-F238E27FC236}">
-                  <a16:creationId xmlns:a16="http://schemas.microsoft.com/office/drawing/2014/main" id="{50A1A25B-D699-C973-F9E8-41E61746C36E}"/>
-                </a:ext>
-              </a:extLst>
-            </p:cNvPr>
-            <p:cNvPicPr>
-              <a:picLocks noChangeAspect="1"/>
-            </p:cNvPicPr>
-            <p:nvPr/>
-          </p:nvPicPr>
-          <p:blipFill>
-            <a:blip r:embed="rId7" cstate="screen">
-              <a:extLst>
-                <a:ext uri="{28A0092B-C50C-407E-A947-70E740481C1C}">
-                  <a14:useLocalDpi xmlns:a14="http://schemas.microsoft.com/office/drawing/2010/main"/>
-                </a:ext>
-                <a:ext uri="{96DAC541-7B7A-43D3-8B79-37D633B846F1}">
-                  <asvg:svgBlip xmlns:asvg="http://schemas.microsoft.com/office/drawing/2016/SVG/main" r:embed="rId8"/>
-                </a:ext>
-              </a:extLst>
-            </a:blip>
-            <a:stretch>
-              <a:fillRect/>
-            </a:stretch>
-          </p:blipFill>
-          <p:spPr>
-            <a:xfrm>
-              <a:off x="8343600" y="2412129"/>
-              <a:ext cx="1954171" cy="360000"/>
-            </a:xfrm>
-            <a:prstGeom prst="rect">
-              <a:avLst/>
-            </a:prstGeom>
-          </p:spPr>
-        </p:pic>
-        <p:grpSp>
-          <p:nvGrpSpPr>
-            <p:cNvPr id="15" name="Group 14">
-              <a:extLst>
-                <a:ext uri="{FF2B5EF4-FFF2-40B4-BE49-F238E27FC236}">
-                  <a16:creationId xmlns:a16="http://schemas.microsoft.com/office/drawing/2014/main" id="{E80F7C00-B899-BC79-5218-8DD951C055F2}"/>
-                </a:ext>
-              </a:extLst>
-            </p:cNvPr>
-            <p:cNvGrpSpPr/>
-            <p:nvPr/>
-          </p:nvGrpSpPr>
-          <p:grpSpPr>
-            <a:xfrm>
-              <a:off x="8343600" y="2915820"/>
-              <a:ext cx="2315118" cy="198000"/>
-              <a:chOff x="8343600" y="2903749"/>
-              <a:chExt cx="2315118" cy="198000"/>
-            </a:xfrm>
-          </p:grpSpPr>
-          <p:pic>
-            <p:nvPicPr>
-              <p:cNvPr id="16" name="Graphic 15">
-                <a:extLst>
-                  <a:ext uri="{FF2B5EF4-FFF2-40B4-BE49-F238E27FC236}">
-                    <a16:creationId xmlns:a16="http://schemas.microsoft.com/office/drawing/2014/main" id="{88E55AF8-2654-F41B-C4A1-D490B9B589E7}"/>
-                  </a:ext>
-                </a:extLst>
-              </p:cNvPr>
-              <p:cNvPicPr>
-                <a:picLocks noChangeAspect="1"/>
-              </p:cNvPicPr>
-              <p:nvPr/>
-            </p:nvPicPr>
-            <p:blipFill>
-              <a:blip r:embed="rId9" cstate="screen">
-                <a:extLst>
-                  <a:ext uri="{28A0092B-C50C-407E-A947-70E740481C1C}">
-                    <a14:useLocalDpi xmlns:a14="http://schemas.microsoft.com/office/drawing/2010/main"/>
-                  </a:ext>
-                  <a:ext uri="{96DAC541-7B7A-43D3-8B79-37D633B846F1}">
-                    <asvg:svgBlip xmlns:asvg="http://schemas.microsoft.com/office/drawing/2016/SVG/main" r:embed="rId10"/>
-                  </a:ext>
-                </a:extLst>
-              </a:blip>
-              <a:stretch>
-                <a:fillRect/>
-              </a:stretch>
-            </p:blipFill>
-            <p:spPr>
-              <a:xfrm>
-                <a:off x="9124668" y="2914533"/>
-                <a:ext cx="1534050" cy="180000"/>
-              </a:xfrm>
-              <a:prstGeom prst="rect">
-                <a:avLst/>
-              </a:prstGeom>
-            </p:spPr>
-          </p:pic>
-          <p:pic>
-            <p:nvPicPr>
-              <p:cNvPr id="17" name="Graphic 16">
-                <a:extLst>
-                  <a:ext uri="{FF2B5EF4-FFF2-40B4-BE49-F238E27FC236}">
-                    <a16:creationId xmlns:a16="http://schemas.microsoft.com/office/drawing/2014/main" id="{57BBDFB2-E80D-449C-2D7B-F4BAB3531D44}"/>
-                  </a:ext>
-                </a:extLst>
-              </p:cNvPr>
-              <p:cNvPicPr>
-                <a:picLocks noChangeAspect="1"/>
-              </p:cNvPicPr>
-              <p:nvPr/>
-            </p:nvPicPr>
-            <p:blipFill>
-              <a:blip r:embed="rId11" cstate="screen">
-                <a:extLst>
-                  <a:ext uri="{28A0092B-C50C-407E-A947-70E740481C1C}">
-                    <a14:useLocalDpi xmlns:a14="http://schemas.microsoft.com/office/drawing/2010/main"/>
-                  </a:ext>
-                  <a:ext uri="{96DAC541-7B7A-43D3-8B79-37D633B846F1}">
-                    <asvg:svgBlip xmlns:asvg="http://schemas.microsoft.com/office/drawing/2016/SVG/main" r:embed="rId12"/>
-                  </a:ext>
-                </a:extLst>
-              </a:blip>
-              <a:stretch>
-                <a:fillRect/>
-              </a:stretch>
-            </p:blipFill>
-            <p:spPr>
-              <a:xfrm>
-                <a:off x="8343600" y="2903749"/>
-                <a:ext cx="565068" cy="198000"/>
-              </a:xfrm>
-              <a:prstGeom prst="rect">
-                <a:avLst/>
-              </a:prstGeom>
-            </p:spPr>
-          </p:pic>
-        </p:grpSp>
-      </p:grpSp>
     </p:spTree>
     <p:extLst>
       <p:ext uri="{BB962C8B-B14F-4D97-AF65-F5344CB8AC3E}">
@@ -14938,9 +16334,14 @@
   <p:clrMapOvr>
     <a:masterClrMapping/>
   </p:clrMapOvr>
-  <p:transition spd="slow">
-    <p:push dir="u"/>
-  </p:transition>
+  <mc:AlternateContent xmlns:mc="http://schemas.openxmlformats.org/markup-compatibility/2006">
+    <mc:Choice xmlns:p14="http://schemas.microsoft.com/office/powerpoint/2010/main" Requires="p14">
+      <p:transition p14:dur="0"/>
+    </mc:Choice>
+    <mc:Fallback>
+      <p:transition/>
+    </mc:Fallback>
+  </mc:AlternateContent>
 </p:sld>
 </file>
 
@@ -15017,93 +16418,14 @@
           <a:lstStyle/>
           <a:p>
             <a:r>
-              <a:rPr lang="en-GB"/>
-              <a:t>Welcome &amp; introduction of bbv</a:t>
-            </a:r>
-          </a:p>
-          <a:p>
-            <a:pPr lvl="1"/>
-            <a:r>
-              <a:rPr lang="en-GB"/>
-              <a:t>First name Last name</a:t>
-            </a:r>
-          </a:p>
-          <a:p>
-            <a:r>
-              <a:rPr lang="en-GB"/>
-              <a:t>Proposed solution</a:t>
-            </a:r>
-          </a:p>
-          <a:p>
-            <a:pPr lvl="1"/>
-            <a:r>
-              <a:rPr lang="en-GB"/>
-              <a:t>First name Last name</a:t>
-            </a:r>
-          </a:p>
-          <a:p>
-            <a:r>
-              <a:rPr lang="en-GB"/>
-              <a:t>Approach, method and deadlines</a:t>
-            </a:r>
-          </a:p>
-          <a:p>
-            <a:pPr lvl="1"/>
-            <a:r>
-              <a:rPr lang="en-GB"/>
-              <a:t>First name Last name</a:t>
-            </a:r>
-          </a:p>
-          <a:p>
-            <a:r>
-              <a:rPr lang="en-GB"/>
-              <a:t>Collaboration model</a:t>
-            </a:r>
-          </a:p>
-          <a:p>
-            <a:pPr lvl="1"/>
-            <a:r>
-              <a:rPr lang="en-GB"/>
-              <a:t>First name Last name</a:t>
-            </a:r>
-          </a:p>
-          <a:p>
-            <a:r>
-              <a:rPr lang="en-GB"/>
-              <a:t>Offer</a:t>
-            </a:r>
-          </a:p>
-          <a:p>
-            <a:pPr lvl="1"/>
-            <a:r>
-              <a:rPr lang="en-GB"/>
-              <a:t>First name Last name</a:t>
-            </a:r>
-          </a:p>
-          <a:p>
-            <a:r>
-              <a:rPr lang="en-GB"/>
-              <a:t>Offer benefits incl. references</a:t>
-            </a:r>
-          </a:p>
-          <a:p>
-            <a:pPr lvl="1"/>
-            <a:r>
-              <a:rPr lang="en-GB"/>
-              <a:t>First name Last name</a:t>
-            </a:r>
-          </a:p>
-          <a:p>
-            <a:r>
-              <a:rPr lang="en-GB"/>
-              <a:t>Next agenda topic</a:t>
-            </a:r>
-          </a:p>
-          <a:p>
-            <a:pPr lvl="1"/>
-            <a:r>
-              <a:rPr lang="en-GB"/>
-              <a:t>First name Last name</a:t>
+              <a:rPr lang="en-GB" dirty="0"/>
+              <a:t>Inflow Screens</a:t>
+            </a:r>
+          </a:p>
+          <a:p>
+            <a:r>
+              <a:rPr lang="en-GB" dirty="0"/>
+              <a:t>Q&amp;A</a:t>
             </a:r>
           </a:p>
         </p:txBody>
@@ -15146,9 +16468,14 @@
   <p:clrMapOvr>
     <a:masterClrMapping/>
   </p:clrMapOvr>
-  <p:transition spd="slow">
-    <p:push dir="u"/>
-  </p:transition>
+  <mc:AlternateContent xmlns:mc="http://schemas.openxmlformats.org/markup-compatibility/2006">
+    <mc:Choice xmlns:p14="http://schemas.microsoft.com/office/powerpoint/2010/main" Requires="p14">
+      <p:transition p14:dur="0"/>
+    </mc:Choice>
+    <mc:Fallback>
+      <p:transition/>
+    </mc:Fallback>
+  </mc:AlternateContent>
 </p:sld>
 </file>
 
@@ -15267,9 +16594,14 @@
   <p:clrMapOvr>
     <a:masterClrMapping/>
   </p:clrMapOvr>
-  <p:transition spd="slow">
-    <p:push dir="u"/>
-  </p:transition>
+  <mc:AlternateContent xmlns:mc="http://schemas.openxmlformats.org/markup-compatibility/2006">
+    <mc:Choice xmlns:p14="http://schemas.microsoft.com/office/powerpoint/2010/main" Requires="p14">
+      <p:transition p14:dur="0"/>
+    </mc:Choice>
+    <mc:Fallback>
+      <p:transition/>
+    </mc:Fallback>
+  </mc:AlternateContent>
 </p:sld>
 </file>
 
@@ -15388,9 +16720,14 @@
   <p:clrMapOvr>
     <a:masterClrMapping/>
   </p:clrMapOvr>
-  <p:transition spd="slow">
-    <p:push dir="u"/>
-  </p:transition>
+  <mc:AlternateContent xmlns:mc="http://schemas.openxmlformats.org/markup-compatibility/2006">
+    <mc:Choice xmlns:p14="http://schemas.microsoft.com/office/powerpoint/2010/main" Requires="p14">
+      <p:transition p14:dur="0"/>
+    </mc:Choice>
+    <mc:Fallback>
+      <p:transition/>
+    </mc:Fallback>
+  </mc:AlternateContent>
 </p:sld>
 </file>
 
@@ -15509,9 +16846,266 @@
   <p:clrMapOvr>
     <a:masterClrMapping/>
   </p:clrMapOvr>
-  <p:transition spd="slow">
-    <p:push dir="u"/>
-  </p:transition>
+  <mc:AlternateContent xmlns:mc="http://schemas.openxmlformats.org/markup-compatibility/2006">
+    <mc:Choice xmlns:p14="http://schemas.microsoft.com/office/powerpoint/2010/main" Requires="p14">
+      <p:transition p14:dur="0"/>
+    </mc:Choice>
+    <mc:Fallback>
+      <p:transition/>
+    </mc:Fallback>
+  </mc:AlternateContent>
+</p:sld>
+</file>
+
+<file path=ppt/slides/slide8.xml><?xml version="1.0" encoding="utf-8"?>
+<p:sld xmlns:a="http://schemas.openxmlformats.org/drawingml/2006/main" xmlns:r="http://schemas.openxmlformats.org/officeDocument/2006/relationships" xmlns:p="http://schemas.openxmlformats.org/presentationml/2006/main">
+  <p:cSld>
+    <p:spTree>
+      <p:nvGrpSpPr>
+        <p:cNvPr id="1" name=""/>
+        <p:cNvGrpSpPr/>
+        <p:nvPr/>
+      </p:nvGrpSpPr>
+      <p:grpSpPr>
+        <a:xfrm>
+          <a:off x="0" y="0"/>
+          <a:ext cx="0" cy="0"/>
+          <a:chOff x="0" y="0"/>
+          <a:chExt cx="0" cy="0"/>
+        </a:xfrm>
+      </p:grpSpPr>
+      <p:sp>
+        <p:nvSpPr>
+          <p:cNvPr id="3" name="Title 2">
+            <a:extLst>
+              <a:ext uri="{FF2B5EF4-FFF2-40B4-BE49-F238E27FC236}">
+                <a16:creationId xmlns:a16="http://schemas.microsoft.com/office/drawing/2014/main" id="{302E7985-D05A-D411-863C-74F6A1A47A4D}"/>
+              </a:ext>
+            </a:extLst>
+          </p:cNvPr>
+          <p:cNvSpPr>
+            <a:spLocks noGrp="1"/>
+          </p:cNvSpPr>
+          <p:nvPr>
+            <p:ph type="title"/>
+          </p:nvPr>
+        </p:nvSpPr>
+        <p:spPr/>
+        <p:txBody>
+          <a:bodyPr/>
+          <a:lstStyle/>
+          <a:p>
+            <a:r>
+              <a:rPr lang="en-US" dirty="0"/>
+              <a:t>Sign Up UI</a:t>
+            </a:r>
+          </a:p>
+        </p:txBody>
+      </p:sp>
+      <p:pic>
+        <p:nvPicPr>
+          <p:cNvPr id="6" name="Picture 5">
+            <a:extLst>
+              <a:ext uri="{FF2B5EF4-FFF2-40B4-BE49-F238E27FC236}">
+                <a16:creationId xmlns:a16="http://schemas.microsoft.com/office/drawing/2014/main" id="{2303464A-1074-3ED1-B92A-3D92CF67DE67}"/>
+              </a:ext>
+            </a:extLst>
+          </p:cNvPr>
+          <p:cNvPicPr>
+            <a:picLocks noChangeAspect="1"/>
+          </p:cNvPicPr>
+          <p:nvPr/>
+        </p:nvPicPr>
+        <p:blipFill>
+          <a:blip r:embed="rId3"/>
+          <a:stretch>
+            <a:fillRect/>
+          </a:stretch>
+        </p:blipFill>
+        <p:spPr>
+          <a:xfrm>
+            <a:off x="431999" y="1117052"/>
+            <a:ext cx="4547120" cy="4841296"/>
+          </a:xfrm>
+          <a:prstGeom prst="rect">
+            <a:avLst/>
+          </a:prstGeom>
+        </p:spPr>
+      </p:pic>
+      <p:pic>
+        <p:nvPicPr>
+          <p:cNvPr id="8" name="Picture 7">
+            <a:extLst>
+              <a:ext uri="{FF2B5EF4-FFF2-40B4-BE49-F238E27FC236}">
+                <a16:creationId xmlns:a16="http://schemas.microsoft.com/office/drawing/2014/main" id="{4A2F3EC8-F636-8AC8-CC48-CB183B2ED58B}"/>
+              </a:ext>
+            </a:extLst>
+          </p:cNvPr>
+          <p:cNvPicPr>
+            <a:picLocks noChangeAspect="1"/>
+          </p:cNvPicPr>
+          <p:nvPr/>
+        </p:nvPicPr>
+        <p:blipFill>
+          <a:blip r:embed="rId4"/>
+          <a:stretch>
+            <a:fillRect/>
+          </a:stretch>
+        </p:blipFill>
+        <p:spPr>
+          <a:xfrm>
+            <a:off x="5798306" y="1098550"/>
+            <a:ext cx="5963482" cy="3724795"/>
+          </a:xfrm>
+          <a:prstGeom prst="rect">
+            <a:avLst/>
+          </a:prstGeom>
+        </p:spPr>
+      </p:pic>
+    </p:spTree>
+    <p:extLst>
+      <p:ext uri="{BB962C8B-B14F-4D97-AF65-F5344CB8AC3E}">
+        <p14:creationId xmlns:p14="http://schemas.microsoft.com/office/powerpoint/2010/main" val="920934897"/>
+      </p:ext>
+    </p:extLst>
+  </p:cSld>
+  <p:clrMapOvr>
+    <a:masterClrMapping/>
+  </p:clrMapOvr>
+  <mc:AlternateContent xmlns:mc="http://schemas.openxmlformats.org/markup-compatibility/2006">
+    <mc:Choice xmlns:p14="http://schemas.microsoft.com/office/powerpoint/2010/main" Requires="p14">
+      <p:transition p14:dur="0"/>
+    </mc:Choice>
+    <mc:Fallback>
+      <p:transition/>
+    </mc:Fallback>
+  </mc:AlternateContent>
+</p:sld>
+</file>
+
+<file path=ppt/slides/slide9.xml><?xml version="1.0" encoding="utf-8"?>
+<p:sld xmlns:a="http://schemas.openxmlformats.org/drawingml/2006/main" xmlns:r="http://schemas.openxmlformats.org/officeDocument/2006/relationships" xmlns:p="http://schemas.openxmlformats.org/presentationml/2006/main">
+  <p:cSld>
+    <p:spTree>
+      <p:nvGrpSpPr>
+        <p:cNvPr id="1" name=""/>
+        <p:cNvGrpSpPr/>
+        <p:nvPr/>
+      </p:nvGrpSpPr>
+      <p:grpSpPr>
+        <a:xfrm>
+          <a:off x="0" y="0"/>
+          <a:ext cx="0" cy="0"/>
+          <a:chOff x="0" y="0"/>
+          <a:chExt cx="0" cy="0"/>
+        </a:xfrm>
+      </p:grpSpPr>
+      <p:sp>
+        <p:nvSpPr>
+          <p:cNvPr id="3" name="Title 2">
+            <a:extLst>
+              <a:ext uri="{FF2B5EF4-FFF2-40B4-BE49-F238E27FC236}">
+                <a16:creationId xmlns:a16="http://schemas.microsoft.com/office/drawing/2014/main" id="{302E7985-D05A-D411-863C-74F6A1A47A4D}"/>
+              </a:ext>
+            </a:extLst>
+          </p:cNvPr>
+          <p:cNvSpPr>
+            <a:spLocks noGrp="1"/>
+          </p:cNvSpPr>
+          <p:nvPr>
+            <p:ph type="title"/>
+          </p:nvPr>
+        </p:nvSpPr>
+        <p:spPr/>
+        <p:txBody>
+          <a:bodyPr/>
+          <a:lstStyle/>
+          <a:p>
+            <a:r>
+              <a:rPr lang="en-US" dirty="0"/>
+              <a:t>Sign Up UI</a:t>
+            </a:r>
+          </a:p>
+        </p:txBody>
+      </p:sp>
+      <p:pic>
+        <p:nvPicPr>
+          <p:cNvPr id="4" name="Picture 3">
+            <a:extLst>
+              <a:ext uri="{FF2B5EF4-FFF2-40B4-BE49-F238E27FC236}">
+                <a16:creationId xmlns:a16="http://schemas.microsoft.com/office/drawing/2014/main" id="{EE36AE82-1BAB-B641-0753-1C85CA1B584B}"/>
+              </a:ext>
+            </a:extLst>
+          </p:cNvPr>
+          <p:cNvPicPr>
+            <a:picLocks noChangeAspect="1"/>
+          </p:cNvPicPr>
+          <p:nvPr/>
+        </p:nvPicPr>
+        <p:blipFill>
+          <a:blip r:embed="rId3"/>
+          <a:stretch>
+            <a:fillRect/>
+          </a:stretch>
+        </p:blipFill>
+        <p:spPr>
+          <a:xfrm>
+            <a:off x="431999" y="1098000"/>
+            <a:ext cx="4779098" cy="3072277"/>
+          </a:xfrm>
+          <a:prstGeom prst="rect">
+            <a:avLst/>
+          </a:prstGeom>
+        </p:spPr>
+      </p:pic>
+      <p:pic>
+        <p:nvPicPr>
+          <p:cNvPr id="7" name="Picture 6">
+            <a:extLst>
+              <a:ext uri="{FF2B5EF4-FFF2-40B4-BE49-F238E27FC236}">
+                <a16:creationId xmlns:a16="http://schemas.microsoft.com/office/drawing/2014/main" id="{379A0C8F-654B-143B-CAC9-E4111FEA26E6}"/>
+              </a:ext>
+            </a:extLst>
+          </p:cNvPr>
+          <p:cNvPicPr>
+            <a:picLocks noChangeAspect="1"/>
+          </p:cNvPicPr>
+          <p:nvPr/>
+        </p:nvPicPr>
+        <p:blipFill>
+          <a:blip r:embed="rId4"/>
+          <a:stretch>
+            <a:fillRect/>
+          </a:stretch>
+        </p:blipFill>
+        <p:spPr>
+          <a:xfrm>
+            <a:off x="6862916" y="1098550"/>
+            <a:ext cx="4897085" cy="3334875"/>
+          </a:xfrm>
+          <a:prstGeom prst="rect">
+            <a:avLst/>
+          </a:prstGeom>
+        </p:spPr>
+      </p:pic>
+    </p:spTree>
+    <p:extLst>
+      <p:ext uri="{BB962C8B-B14F-4D97-AF65-F5344CB8AC3E}">
+        <p14:creationId xmlns:p14="http://schemas.microsoft.com/office/powerpoint/2010/main" val="1232539248"/>
+      </p:ext>
+    </p:extLst>
+  </p:cSld>
+  <p:clrMapOvr>
+    <a:masterClrMapping/>
+  </p:clrMapOvr>
+  <mc:AlternateContent xmlns:mc="http://schemas.openxmlformats.org/markup-compatibility/2006">
+    <mc:Choice xmlns:p14="http://schemas.microsoft.com/office/powerpoint/2010/main" Requires="p14">
+      <p:transition p14:dur="0"/>
+    </mc:Choice>
+    <mc:Fallback>
+      <p:transition/>
+    </mc:Fallback>
+  </mc:AlternateContent>
 </p:sld>
 </file>
 
@@ -16595,6 +18189,15 @@
 </file>
 
 <file path=customXml/item1.xml><?xml version="1.0" encoding="utf-8"?>
+<?mso-contentType ?>
+<FormTemplates xmlns="http://schemas.microsoft.com/sharepoint/v3/contenttype/forms">
+  <Display>DocumentLibraryForm</Display>
+  <Edit>DocumentLibraryForm</Edit>
+  <New>DocumentLibraryForm</New>
+</FormTemplates>
+</file>
+
+<file path=customXml/item2.xml><?xml version="1.0" encoding="utf-8"?>
 <ct:contentTypeSchema xmlns:ct="http://schemas.microsoft.com/office/2006/metadata/contentType" xmlns:ma="http://schemas.microsoft.com/office/2006/metadata/properties/metaAttributes" ct:_="" ma:_="" ma:contentTypeName="Document" ma:contentTypeID="0x010100AFECA5C03B5B3648A59C327F9B592BCA" ma:contentTypeVersion="18" ma:contentTypeDescription="Create a new document." ma:contentTypeScope="" ma:versionID="6c18a499376fe99d18d064f593f17266">
   <xsd:schema xmlns:xsd="http://www.w3.org/2001/XMLSchema" xmlns:xs="http://www.w3.org/2001/XMLSchema" xmlns:p="http://schemas.microsoft.com/office/2006/metadata/properties" xmlns:ns2="ab110e31-9a28-463c-b599-9105678ef09e" xmlns:ns3="b416dfb7-f3da-461d-9305-4b76a01efcc1" targetNamespace="http://schemas.microsoft.com/office/2006/metadata/properties" ma:root="true" ma:fieldsID="c0ea90f0bc4730787fb2734bd82545d6" ns2:_="" ns3:_="">
     <xsd:import namespace="ab110e31-9a28-463c-b599-9105678ef09e"/>
@@ -16843,16 +18446,15 @@
 </ct:contentTypeSchema>
 </file>
 
-<file path=customXml/item2.xml><?xml version="1.0" encoding="utf-8"?>
-<?mso-contentType ?>
-<FormTemplates xmlns="http://schemas.microsoft.com/sharepoint/v3/contenttype/forms">
-  <Display>DocumentLibraryForm</Display>
-  <Edit>DocumentLibraryForm</Edit>
-  <New>DocumentLibraryForm</New>
-</FormTemplates>
+<file path=customXml/itemProps1.xml><?xml version="1.0" encoding="utf-8"?>
+<ds:datastoreItem xmlns:ds="http://schemas.openxmlformats.org/officeDocument/2006/customXml" ds:itemID="{E3CB484D-016C-43DE-886B-249507DD658A}">
+  <ds:schemaRefs>
+    <ds:schemaRef ds:uri="http://schemas.microsoft.com/sharepoint/v3/contenttype/forms"/>
+  </ds:schemaRefs>
+</ds:datastoreItem>
 </file>
 
-<file path=customXml/itemProps1.xml><?xml version="1.0" encoding="utf-8"?>
+<file path=customXml/itemProps2.xml><?xml version="1.0" encoding="utf-8"?>
 <ds:datastoreItem xmlns:ds="http://schemas.openxmlformats.org/officeDocument/2006/customXml" ds:itemID="{30C702D9-9E55-4D09-9269-3B464CFDB013}">
   <ds:schemaRefs>
     <ds:schemaRef ds:uri="http://schemas.microsoft.com/office/2006/metadata/contentType"/>
@@ -16869,12 +18471,4 @@
     <ds:schemaRef ds:uri="http://schemas.microsoft.com/internal/obd"/>
   </ds:schemaRefs>
 </ds:datastoreItem>
-</file>
-
-<file path=customXml/itemProps2.xml><?xml version="1.0" encoding="utf-8"?>
-<ds:datastoreItem xmlns:ds="http://schemas.openxmlformats.org/officeDocument/2006/customXml" ds:itemID="{E3CB484D-016C-43DE-886B-249507DD658A}">
-  <ds:schemaRefs>
-    <ds:schemaRef ds:uri="http://schemas.microsoft.com/sharepoint/v3/contenttype/forms"/>
-  </ds:schemaRefs>
-</ds:datastoreItem>
 </file>
</xml_diff>